<commit_message>
Moved Flight Phase guide to Airliner the section and updated illustration
</commit_message>
<xml_diff>
--- a/src/assets/advanced-guides/FlightPhases.pptx
+++ b/src/assets/advanced-guides/FlightPhases.pptx
@@ -104,6 +104,11 @@
       </a:defRPr>
     </a:lvl9pPr>
   </p:defaultTextStyle>
+  <p:extLst>
+    <p:ext uri="{EFAFB233-063F-42B5-8137-9DF3F51BA10A}">
+      <p15:sldGuideLst xmlns:p15="http://schemas.microsoft.com/office/powerpoint/2012/main"/>
+    </p:ext>
+  </p:extLst>
 </p:presentation>
 </file>
 
@@ -254,7 +259,7 @@
           <a:p>
             <a:fld id="{FF565308-7C86-4C83-AB5D-49D28F542EE9}" type="datetimeFigureOut">
               <a:rPr lang="de-DE" smtClean="0"/>
-              <a:t>26.11.2021</a:t>
+              <a:t>02.05.2024</a:t>
             </a:fld>
             <a:endParaRPr lang="de-DE"/>
           </a:p>
@@ -452,7 +457,7 @@
           <a:p>
             <a:fld id="{FF565308-7C86-4C83-AB5D-49D28F542EE9}" type="datetimeFigureOut">
               <a:rPr lang="de-DE" smtClean="0"/>
-              <a:t>26.11.2021</a:t>
+              <a:t>02.05.2024</a:t>
             </a:fld>
             <a:endParaRPr lang="de-DE"/>
           </a:p>
@@ -660,7 +665,7 @@
           <a:p>
             <a:fld id="{FF565308-7C86-4C83-AB5D-49D28F542EE9}" type="datetimeFigureOut">
               <a:rPr lang="de-DE" smtClean="0"/>
-              <a:t>26.11.2021</a:t>
+              <a:t>02.05.2024</a:t>
             </a:fld>
             <a:endParaRPr lang="de-DE"/>
           </a:p>
@@ -858,7 +863,7 @@
           <a:p>
             <a:fld id="{FF565308-7C86-4C83-AB5D-49D28F542EE9}" type="datetimeFigureOut">
               <a:rPr lang="de-DE" smtClean="0"/>
-              <a:t>26.11.2021</a:t>
+              <a:t>02.05.2024</a:t>
             </a:fld>
             <a:endParaRPr lang="de-DE"/>
           </a:p>
@@ -1133,7 +1138,7 @@
           <a:p>
             <a:fld id="{FF565308-7C86-4C83-AB5D-49D28F542EE9}" type="datetimeFigureOut">
               <a:rPr lang="de-DE" smtClean="0"/>
-              <a:t>26.11.2021</a:t>
+              <a:t>02.05.2024</a:t>
             </a:fld>
             <a:endParaRPr lang="de-DE"/>
           </a:p>
@@ -1398,7 +1403,7 @@
           <a:p>
             <a:fld id="{FF565308-7C86-4C83-AB5D-49D28F542EE9}" type="datetimeFigureOut">
               <a:rPr lang="de-DE" smtClean="0"/>
-              <a:t>26.11.2021</a:t>
+              <a:t>02.05.2024</a:t>
             </a:fld>
             <a:endParaRPr lang="de-DE"/>
           </a:p>
@@ -1810,7 +1815,7 @@
           <a:p>
             <a:fld id="{FF565308-7C86-4C83-AB5D-49D28F542EE9}" type="datetimeFigureOut">
               <a:rPr lang="de-DE" smtClean="0"/>
-              <a:t>26.11.2021</a:t>
+              <a:t>02.05.2024</a:t>
             </a:fld>
             <a:endParaRPr lang="de-DE"/>
           </a:p>
@@ -1951,7 +1956,7 @@
           <a:p>
             <a:fld id="{FF565308-7C86-4C83-AB5D-49D28F542EE9}" type="datetimeFigureOut">
               <a:rPr lang="de-DE" smtClean="0"/>
-              <a:t>26.11.2021</a:t>
+              <a:t>02.05.2024</a:t>
             </a:fld>
             <a:endParaRPr lang="de-DE"/>
           </a:p>
@@ -2064,7 +2069,7 @@
           <a:p>
             <a:fld id="{FF565308-7C86-4C83-AB5D-49D28F542EE9}" type="datetimeFigureOut">
               <a:rPr lang="de-DE" smtClean="0"/>
-              <a:t>26.11.2021</a:t>
+              <a:t>02.05.2024</a:t>
             </a:fld>
             <a:endParaRPr lang="de-DE"/>
           </a:p>
@@ -2375,7 +2380,7 @@
           <a:p>
             <a:fld id="{FF565308-7C86-4C83-AB5D-49D28F542EE9}" type="datetimeFigureOut">
               <a:rPr lang="de-DE" smtClean="0"/>
-              <a:t>26.11.2021</a:t>
+              <a:t>02.05.2024</a:t>
             </a:fld>
             <a:endParaRPr lang="de-DE"/>
           </a:p>
@@ -2663,7 +2668,7 @@
           <a:p>
             <a:fld id="{FF565308-7C86-4C83-AB5D-49D28F542EE9}" type="datetimeFigureOut">
               <a:rPr lang="de-DE" smtClean="0"/>
-              <a:t>26.11.2021</a:t>
+              <a:t>02.05.2024</a:t>
             </a:fld>
             <a:endParaRPr lang="de-DE"/>
           </a:p>
@@ -2904,7 +2909,7 @@
           <a:p>
             <a:fld id="{FF565308-7C86-4C83-AB5D-49D28F542EE9}" type="datetimeFigureOut">
               <a:rPr lang="de-DE" smtClean="0"/>
-              <a:t>26.11.2021</a:t>
+              <a:t>02.05.2024</a:t>
             </a:fld>
             <a:endParaRPr lang="de-DE"/>
           </a:p>
@@ -3335,7 +3340,7 @@
         </p:nvSpPr>
         <p:spPr>
           <a:xfrm>
-            <a:off x="8980562" y="4260361"/>
+            <a:off x="8646107" y="4229161"/>
             <a:ext cx="1135827" cy="385874"/>
           </a:xfrm>
           <a:prstGeom prst="callout1">
@@ -3855,7 +3860,7 @@
         </p:nvSpPr>
         <p:spPr>
           <a:xfrm>
-            <a:off x="10126952" y="2973129"/>
+            <a:off x="10431931" y="2890579"/>
             <a:ext cx="1374202" cy="369332"/>
           </a:xfrm>
           <a:prstGeom prst="rect">
@@ -4209,8 +4214,8 @@
           </p:nvCxnSpPr>
           <p:spPr>
             <a:xfrm flipV="1">
-              <a:off x="4354643" y="3218608"/>
-              <a:ext cx="465665" cy="249870"/>
+              <a:off x="4354643" y="3015862"/>
+              <a:ext cx="260459" cy="452616"/>
             </a:xfrm>
             <a:prstGeom prst="line">
               <a:avLst/>
@@ -4255,8 +4260,8 @@
           </p:nvCxnSpPr>
           <p:spPr>
             <a:xfrm flipV="1">
-              <a:off x="4824728" y="2208594"/>
-              <a:ext cx="634998" cy="1010014"/>
+              <a:off x="4615102" y="2461097"/>
+              <a:ext cx="822841" cy="554765"/>
             </a:xfrm>
             <a:prstGeom prst="line">
               <a:avLst/>
@@ -4301,8 +4306,8 @@
           </p:nvCxnSpPr>
           <p:spPr>
             <a:xfrm>
-              <a:off x="5459726" y="2208595"/>
-              <a:ext cx="1674614" cy="0"/>
+              <a:off x="6219521" y="2208594"/>
+              <a:ext cx="914819" cy="1"/>
             </a:xfrm>
             <a:prstGeom prst="line">
               <a:avLst/>
@@ -4348,7 +4353,7 @@
           <p:spPr>
             <a:xfrm>
               <a:off x="7131610" y="2208594"/>
-              <a:ext cx="481586" cy="505007"/>
+              <a:ext cx="708293" cy="687006"/>
             </a:xfrm>
             <a:prstGeom prst="line">
               <a:avLst/>
@@ -4393,8 +4398,8 @@
           </p:nvCxnSpPr>
           <p:spPr>
             <a:xfrm>
-              <a:off x="7609885" y="2713601"/>
-              <a:ext cx="547836" cy="715399"/>
+              <a:off x="7844735" y="2895600"/>
+              <a:ext cx="309209" cy="526963"/>
             </a:xfrm>
             <a:prstGeom prst="line">
               <a:avLst/>
@@ -4486,7 +4491,7 @@
           <p:spPr>
             <a:xfrm>
               <a:off x="8994449" y="3741061"/>
-              <a:ext cx="881388" cy="0"/>
+              <a:ext cx="554026" cy="0"/>
             </a:xfrm>
             <a:prstGeom prst="line">
               <a:avLst/>
@@ -4531,8 +4536,8 @@
           </p:nvCxnSpPr>
           <p:spPr>
             <a:xfrm>
-              <a:off x="9875837" y="3741061"/>
-              <a:ext cx="430100" cy="638219"/>
+              <a:off x="9548475" y="3741061"/>
+              <a:ext cx="757462" cy="638219"/>
             </a:xfrm>
             <a:prstGeom prst="line">
               <a:avLst/>
@@ -4820,7 +4825,7 @@
         </p:nvSpPr>
         <p:spPr>
           <a:xfrm>
-            <a:off x="4196247" y="1434061"/>
+            <a:off x="4246012" y="1746272"/>
             <a:ext cx="1135827" cy="385874"/>
           </a:xfrm>
           <a:prstGeom prst="callout1">
@@ -4912,8 +4917,8 @@
             <a:avLst>
               <a:gd name="adj1" fmla="val 85892"/>
               <a:gd name="adj2" fmla="val 75525"/>
-              <a:gd name="adj3" fmla="val 175692"/>
-              <a:gd name="adj4" fmla="val 105234"/>
+              <a:gd name="adj3" fmla="val 188857"/>
+              <a:gd name="adj4" fmla="val 109147"/>
             </a:avLst>
           </a:prstGeom>
         </p:spPr>
@@ -5123,6 +5128,526 @@
                 </a:solidFill>
               </a:rPr>
               <a:t>Point</a:t>
+            </a:r>
+          </a:p>
+        </p:txBody>
+      </p:sp>
+      <p:sp>
+        <p:nvSpPr>
+          <p:cNvPr id="2" name="Legende: mit Linie ohne Rahmen 1">
+            <a:extLst>
+              <a:ext uri="{FF2B5EF4-FFF2-40B4-BE49-F238E27FC236}">
+                <a16:creationId xmlns:a16="http://schemas.microsoft.com/office/drawing/2014/main" id="{4EB18DBD-E6F5-D886-F1FF-C466AC639190}"/>
+              </a:ext>
+            </a:extLst>
+          </p:cNvPr>
+          <p:cNvSpPr/>
+          <p:nvPr/>
+        </p:nvSpPr>
+        <p:spPr>
+          <a:xfrm>
+            <a:off x="2463992" y="2587255"/>
+            <a:ext cx="1135827" cy="385874"/>
+          </a:xfrm>
+          <a:prstGeom prst="callout1">
+            <a:avLst>
+              <a:gd name="adj1" fmla="val 85892"/>
+              <a:gd name="adj2" fmla="val 75525"/>
+              <a:gd name="adj3" fmla="val 221171"/>
+              <a:gd name="adj4" fmla="val 108487"/>
+            </a:avLst>
+          </a:prstGeom>
+        </p:spPr>
+        <p:style>
+          <a:lnRef idx="2">
+            <a:schemeClr val="dk1"/>
+          </a:lnRef>
+          <a:fillRef idx="1">
+            <a:schemeClr val="lt1"/>
+          </a:fillRef>
+          <a:effectRef idx="0">
+            <a:schemeClr val="dk1"/>
+          </a:effectRef>
+          <a:fontRef idx="minor">
+            <a:schemeClr val="dk1"/>
+          </a:fontRef>
+        </p:style>
+        <p:txBody>
+          <a:bodyPr rtlCol="0" anchor="ctr"/>
+          <a:lstStyle/>
+          <a:p>
+            <a:pPr algn="ctr"/>
+            <a:r>
+              <a:rPr lang="de-DE" sz="1200" dirty="0" err="1">
+                <a:solidFill>
+                  <a:schemeClr val="dk1"/>
+                </a:solidFill>
+              </a:rPr>
+              <a:t>Altitude</a:t>
+            </a:r>
+            <a:r>
+              <a:rPr lang="de-DE" sz="1200" dirty="0">
+                <a:solidFill>
+                  <a:schemeClr val="dk1"/>
+                </a:solidFill>
+              </a:rPr>
+              <a:t> </a:t>
+            </a:r>
+            <a:r>
+              <a:rPr lang="de-DE" sz="1200" dirty="0" err="1">
+                <a:solidFill>
+                  <a:schemeClr val="dk1"/>
+                </a:solidFill>
+              </a:rPr>
+              <a:t>Constraint</a:t>
+            </a:r>
+            <a:endParaRPr lang="de-DE" sz="1200" dirty="0">
+              <a:solidFill>
+                <a:schemeClr val="dk1"/>
+              </a:solidFill>
+            </a:endParaRPr>
+          </a:p>
+        </p:txBody>
+      </p:sp>
+      <p:sp>
+        <p:nvSpPr>
+          <p:cNvPr id="8" name="Legende: mit Linie ohne Rahmen 7">
+            <a:extLst>
+              <a:ext uri="{FF2B5EF4-FFF2-40B4-BE49-F238E27FC236}">
+                <a16:creationId xmlns:a16="http://schemas.microsoft.com/office/drawing/2014/main" id="{1ACE47C7-6ECA-FCCD-A2F0-1C260B001C94}"/>
+              </a:ext>
+            </a:extLst>
+          </p:cNvPr>
+          <p:cNvSpPr/>
+          <p:nvPr/>
+        </p:nvSpPr>
+        <p:spPr>
+          <a:xfrm>
+            <a:off x="3358091" y="2170161"/>
+            <a:ext cx="1135827" cy="385874"/>
+          </a:xfrm>
+          <a:prstGeom prst="callout1">
+            <a:avLst>
+              <a:gd name="adj1" fmla="val 85892"/>
+              <a:gd name="adj2" fmla="val 75525"/>
+              <a:gd name="adj3" fmla="val 221171"/>
+              <a:gd name="adj4" fmla="val 108487"/>
+            </a:avLst>
+          </a:prstGeom>
+        </p:spPr>
+        <p:style>
+          <a:lnRef idx="2">
+            <a:schemeClr val="dk1"/>
+          </a:lnRef>
+          <a:fillRef idx="1">
+            <a:schemeClr val="lt1"/>
+          </a:fillRef>
+          <a:effectRef idx="0">
+            <a:schemeClr val="dk1"/>
+          </a:effectRef>
+          <a:fontRef idx="minor">
+            <a:schemeClr val="dk1"/>
+          </a:fontRef>
+        </p:style>
+        <p:txBody>
+          <a:bodyPr rtlCol="0" anchor="ctr"/>
+          <a:lstStyle/>
+          <a:p>
+            <a:pPr algn="ctr"/>
+            <a:r>
+              <a:rPr lang="de-DE" sz="1200" dirty="0">
+                <a:solidFill>
+                  <a:schemeClr val="dk1"/>
+                </a:solidFill>
+              </a:rPr>
+              <a:t>Speed </a:t>
+            </a:r>
+            <a:br>
+              <a:rPr lang="de-DE" sz="1200" dirty="0">
+                <a:solidFill>
+                  <a:schemeClr val="dk1"/>
+                </a:solidFill>
+              </a:rPr>
+            </a:br>
+            <a:r>
+              <a:rPr lang="de-DE" sz="1200" dirty="0">
+                <a:solidFill>
+                  <a:schemeClr val="dk1"/>
+                </a:solidFill>
+              </a:rPr>
+              <a:t>Limit</a:t>
+            </a:r>
+          </a:p>
+        </p:txBody>
+      </p:sp>
+      <p:cxnSp>
+        <p:nvCxnSpPr>
+          <p:cNvPr id="11" name="Gerader Verbinder 10">
+            <a:extLst>
+              <a:ext uri="{FF2B5EF4-FFF2-40B4-BE49-F238E27FC236}">
+                <a16:creationId xmlns:a16="http://schemas.microsoft.com/office/drawing/2014/main" id="{4FF6B3E5-623F-09FB-0C60-2FADA4F06E48}"/>
+              </a:ext>
+            </a:extLst>
+          </p:cNvPr>
+          <p:cNvCxnSpPr>
+            <a:cxnSpLocks/>
+          </p:cNvCxnSpPr>
+          <p:nvPr/>
+        </p:nvCxnSpPr>
+        <p:spPr>
+          <a:xfrm>
+            <a:off x="5462482" y="2452379"/>
+            <a:ext cx="405129" cy="0"/>
+          </a:xfrm>
+          <a:prstGeom prst="line">
+            <a:avLst/>
+          </a:prstGeom>
+          <a:ln w="76200" cap="rnd">
+            <a:solidFill>
+              <a:schemeClr val="tx1"/>
+            </a:solidFill>
+            <a:miter lim="800000"/>
+            <a:headEnd type="none" w="med" len="med"/>
+            <a:tailEnd type="none" w="med" len="med"/>
+          </a:ln>
+        </p:spPr>
+        <p:style>
+          <a:lnRef idx="1">
+            <a:schemeClr val="dk1"/>
+          </a:lnRef>
+          <a:fillRef idx="0">
+            <a:schemeClr val="dk1"/>
+          </a:fillRef>
+          <a:effectRef idx="0">
+            <a:schemeClr val="dk1"/>
+          </a:effectRef>
+          <a:fontRef idx="minor">
+            <a:schemeClr val="tx1"/>
+          </a:fontRef>
+        </p:style>
+      </p:cxnSp>
+      <p:cxnSp>
+        <p:nvCxnSpPr>
+          <p:cNvPr id="12" name="Gerader Verbinder 11">
+            <a:extLst>
+              <a:ext uri="{FF2B5EF4-FFF2-40B4-BE49-F238E27FC236}">
+                <a16:creationId xmlns:a16="http://schemas.microsoft.com/office/drawing/2014/main" id="{E6DDBB61-0F94-ED61-047A-A063C937169B}"/>
+              </a:ext>
+            </a:extLst>
+          </p:cNvPr>
+          <p:cNvCxnSpPr>
+            <a:cxnSpLocks/>
+          </p:cNvCxnSpPr>
+          <p:nvPr/>
+        </p:nvCxnSpPr>
+        <p:spPr>
+          <a:xfrm flipV="1">
+            <a:off x="5878298" y="2208594"/>
+            <a:ext cx="341223" cy="243785"/>
+          </a:xfrm>
+          <a:prstGeom prst="line">
+            <a:avLst/>
+          </a:prstGeom>
+          <a:ln w="76200" cap="rnd">
+            <a:solidFill>
+              <a:schemeClr val="tx1"/>
+            </a:solidFill>
+            <a:miter lim="800000"/>
+            <a:headEnd type="none" w="med" len="med"/>
+            <a:tailEnd type="none" w="med" len="med"/>
+          </a:ln>
+        </p:spPr>
+        <p:style>
+          <a:lnRef idx="1">
+            <a:schemeClr val="dk1"/>
+          </a:lnRef>
+          <a:fillRef idx="0">
+            <a:schemeClr val="dk1"/>
+          </a:fillRef>
+          <a:effectRef idx="0">
+            <a:schemeClr val="dk1"/>
+          </a:effectRef>
+          <a:fontRef idx="minor">
+            <a:schemeClr val="tx1"/>
+          </a:fontRef>
+        </p:style>
+      </p:cxnSp>
+      <p:sp>
+        <p:nvSpPr>
+          <p:cNvPr id="15" name="Legende: mit Linie ohne Rahmen 14">
+            <a:extLst>
+              <a:ext uri="{FF2B5EF4-FFF2-40B4-BE49-F238E27FC236}">
+                <a16:creationId xmlns:a16="http://schemas.microsoft.com/office/drawing/2014/main" id="{15D4CC6E-72D8-F8E1-381C-DEA82C830BED}"/>
+              </a:ext>
+            </a:extLst>
+          </p:cNvPr>
+          <p:cNvSpPr/>
+          <p:nvPr/>
+        </p:nvSpPr>
+        <p:spPr>
+          <a:xfrm>
+            <a:off x="4780503" y="1434061"/>
+            <a:ext cx="1135827" cy="385874"/>
+          </a:xfrm>
+          <a:prstGeom prst="callout1">
+            <a:avLst>
+              <a:gd name="adj1" fmla="val 85892"/>
+              <a:gd name="adj2" fmla="val 68257"/>
+              <a:gd name="adj3" fmla="val 253036"/>
+              <a:gd name="adj4" fmla="val 80075"/>
+            </a:avLst>
+          </a:prstGeom>
+        </p:spPr>
+        <p:style>
+          <a:lnRef idx="2">
+            <a:schemeClr val="dk1"/>
+          </a:lnRef>
+          <a:fillRef idx="1">
+            <a:schemeClr val="lt1"/>
+          </a:fillRef>
+          <a:effectRef idx="0">
+            <a:schemeClr val="dk1"/>
+          </a:effectRef>
+          <a:fontRef idx="minor">
+            <a:schemeClr val="dk1"/>
+          </a:fontRef>
+        </p:style>
+        <p:txBody>
+          <a:bodyPr rtlCol="0" anchor="ctr"/>
+          <a:lstStyle/>
+          <a:p>
+            <a:pPr algn="ctr"/>
+            <a:r>
+              <a:rPr lang="de-DE" sz="1200" dirty="0" err="1">
+                <a:solidFill>
+                  <a:schemeClr val="dk1"/>
+                </a:solidFill>
+              </a:rPr>
+              <a:t>Step</a:t>
+            </a:r>
+            <a:r>
+              <a:rPr lang="de-DE" sz="1200" dirty="0">
+                <a:solidFill>
+                  <a:schemeClr val="dk1"/>
+                </a:solidFill>
+              </a:rPr>
+              <a:t> </a:t>
+            </a:r>
+            <a:r>
+              <a:rPr lang="de-DE" sz="1200" dirty="0" err="1">
+                <a:solidFill>
+                  <a:schemeClr val="dk1"/>
+                </a:solidFill>
+              </a:rPr>
+              <a:t>Altitude</a:t>
+            </a:r>
+            <a:endParaRPr lang="de-DE" sz="1200" dirty="0">
+              <a:solidFill>
+                <a:schemeClr val="dk1"/>
+              </a:solidFill>
+            </a:endParaRPr>
+          </a:p>
+        </p:txBody>
+      </p:sp>
+      <p:sp>
+        <p:nvSpPr>
+          <p:cNvPr id="16" name="Legende: mit Linie ohne Rahmen 15">
+            <a:extLst>
+              <a:ext uri="{FF2B5EF4-FFF2-40B4-BE49-F238E27FC236}">
+                <a16:creationId xmlns:a16="http://schemas.microsoft.com/office/drawing/2014/main" id="{578BC8D3-969C-ACB7-7C59-32EC44A97DC7}"/>
+              </a:ext>
+            </a:extLst>
+          </p:cNvPr>
+          <p:cNvSpPr/>
+          <p:nvPr/>
+        </p:nvSpPr>
+        <p:spPr>
+          <a:xfrm>
+            <a:off x="7856206" y="2137549"/>
+            <a:ext cx="1135827" cy="385874"/>
+          </a:xfrm>
+          <a:prstGeom prst="callout1">
+            <a:avLst>
+              <a:gd name="adj1" fmla="val 84246"/>
+              <a:gd name="adj2" fmla="val 25768"/>
+              <a:gd name="adj3" fmla="val 186613"/>
+              <a:gd name="adj4" fmla="val 1706"/>
+            </a:avLst>
+          </a:prstGeom>
+        </p:spPr>
+        <p:style>
+          <a:lnRef idx="2">
+            <a:schemeClr val="dk1"/>
+          </a:lnRef>
+          <a:fillRef idx="1">
+            <a:schemeClr val="lt1"/>
+          </a:fillRef>
+          <a:effectRef idx="0">
+            <a:schemeClr val="dk1"/>
+          </a:effectRef>
+          <a:fontRef idx="minor">
+            <a:schemeClr val="dk1"/>
+          </a:fontRef>
+        </p:style>
+        <p:txBody>
+          <a:bodyPr rtlCol="0" anchor="ctr"/>
+          <a:lstStyle/>
+          <a:p>
+            <a:pPr algn="ctr"/>
+            <a:r>
+              <a:rPr lang="de-DE" sz="1200" dirty="0">
+                <a:solidFill>
+                  <a:schemeClr val="dk1"/>
+                </a:solidFill>
+              </a:rPr>
+              <a:t>Speed </a:t>
+            </a:r>
+            <a:br>
+              <a:rPr lang="de-DE" sz="1200" dirty="0">
+                <a:solidFill>
+                  <a:schemeClr val="dk1"/>
+                </a:solidFill>
+              </a:rPr>
+            </a:br>
+            <a:r>
+              <a:rPr lang="de-DE" sz="1200" dirty="0">
+                <a:solidFill>
+                  <a:schemeClr val="dk1"/>
+                </a:solidFill>
+              </a:rPr>
+              <a:t>Limit</a:t>
+            </a:r>
+          </a:p>
+        </p:txBody>
+      </p:sp>
+      <p:sp>
+        <p:nvSpPr>
+          <p:cNvPr id="24" name="Legende: mit Linie ohne Rahmen 23">
+            <a:extLst>
+              <a:ext uri="{FF2B5EF4-FFF2-40B4-BE49-F238E27FC236}">
+                <a16:creationId xmlns:a16="http://schemas.microsoft.com/office/drawing/2014/main" id="{6CF54A5A-2E18-38A3-81D1-9960329604EE}"/>
+              </a:ext>
+            </a:extLst>
+          </p:cNvPr>
+          <p:cNvSpPr/>
+          <p:nvPr/>
+        </p:nvSpPr>
+        <p:spPr>
+          <a:xfrm>
+            <a:off x="8159229" y="2660494"/>
+            <a:ext cx="1135827" cy="385874"/>
+          </a:xfrm>
+          <a:prstGeom prst="callout1">
+            <a:avLst>
+              <a:gd name="adj1" fmla="val 85480"/>
+              <a:gd name="adj2" fmla="val 21575"/>
+              <a:gd name="adj3" fmla="val 186613"/>
+              <a:gd name="adj4" fmla="val 1706"/>
+            </a:avLst>
+          </a:prstGeom>
+        </p:spPr>
+        <p:style>
+          <a:lnRef idx="2">
+            <a:schemeClr val="dk1"/>
+          </a:lnRef>
+          <a:fillRef idx="1">
+            <a:schemeClr val="lt1"/>
+          </a:fillRef>
+          <a:effectRef idx="0">
+            <a:schemeClr val="dk1"/>
+          </a:effectRef>
+          <a:fontRef idx="minor">
+            <a:schemeClr val="dk1"/>
+          </a:fontRef>
+        </p:style>
+        <p:txBody>
+          <a:bodyPr rtlCol="0" anchor="ctr"/>
+          <a:lstStyle/>
+          <a:p>
+            <a:pPr algn="ctr"/>
+            <a:r>
+              <a:rPr lang="de-DE" sz="1200" dirty="0">
+                <a:solidFill>
+                  <a:schemeClr val="dk1"/>
+                </a:solidFill>
+              </a:rPr>
+              <a:t>Speed </a:t>
+            </a:r>
+            <a:br>
+              <a:rPr lang="de-DE" sz="1200" dirty="0">
+                <a:solidFill>
+                  <a:schemeClr val="dk1"/>
+                </a:solidFill>
+              </a:rPr>
+            </a:br>
+            <a:r>
+              <a:rPr lang="de-DE" sz="1200" dirty="0" err="1">
+                <a:solidFill>
+                  <a:schemeClr val="dk1"/>
+                </a:solidFill>
+              </a:rPr>
+              <a:t>Constraint</a:t>
+            </a:r>
+            <a:endParaRPr lang="de-DE" sz="1200" dirty="0">
+              <a:solidFill>
+                <a:schemeClr val="dk1"/>
+              </a:solidFill>
+            </a:endParaRPr>
+          </a:p>
+        </p:txBody>
+      </p:sp>
+      <p:sp>
+        <p:nvSpPr>
+          <p:cNvPr id="31" name="Legende: mit Linie ohne Rahmen 30">
+            <a:extLst>
+              <a:ext uri="{FF2B5EF4-FFF2-40B4-BE49-F238E27FC236}">
+                <a16:creationId xmlns:a16="http://schemas.microsoft.com/office/drawing/2014/main" id="{82848CDE-BFB9-E339-ECA1-48388B56B480}"/>
+              </a:ext>
+            </a:extLst>
+          </p:cNvPr>
+          <p:cNvSpPr/>
+          <p:nvPr/>
+        </p:nvSpPr>
+        <p:spPr>
+          <a:xfrm>
+            <a:off x="9781934" y="3356797"/>
+            <a:ext cx="1135827" cy="275681"/>
+          </a:xfrm>
+          <a:prstGeom prst="callout1">
+            <a:avLst>
+              <a:gd name="adj1" fmla="val 85480"/>
+              <a:gd name="adj2" fmla="val 21575"/>
+              <a:gd name="adj3" fmla="val 223467"/>
+              <a:gd name="adj4" fmla="val 8415"/>
+            </a:avLst>
+          </a:prstGeom>
+        </p:spPr>
+        <p:style>
+          <a:lnRef idx="2">
+            <a:schemeClr val="dk1"/>
+          </a:lnRef>
+          <a:fillRef idx="1">
+            <a:schemeClr val="lt1"/>
+          </a:fillRef>
+          <a:effectRef idx="0">
+            <a:schemeClr val="dk1"/>
+          </a:effectRef>
+          <a:fontRef idx="minor">
+            <a:schemeClr val="dk1"/>
+          </a:fontRef>
+        </p:style>
+        <p:txBody>
+          <a:bodyPr rtlCol="0" anchor="ctr"/>
+          <a:lstStyle/>
+          <a:p>
+            <a:pPr algn="ctr"/>
+            <a:r>
+              <a:rPr lang="de-DE" sz="1200" dirty="0">
+                <a:solidFill>
+                  <a:schemeClr val="dk1"/>
+                </a:solidFill>
+              </a:rPr>
+              <a:t>Final Approach </a:t>
             </a:r>
           </a:p>
         </p:txBody>

</xml_diff>